<commit_message>
New version of PowerPoint
</commit_message>
<xml_diff>
--- a/Java 8 Date and Time API.pptx
+++ b/Java 8 Date and Time API.pptx
@@ -325,7 +325,7 @@
           <a:p>
             <a:fld id="{4521DC5A-3FE3-4FD1-BF87-57592AFF8A1E}" type="datetimeFigureOut">
               <a:rPr lang="en-US" smtClean="0"/>
-              <a:t>3/12/2014</a:t>
+              <a:t>3/16/2014</a:t>
             </a:fld>
             <a:endParaRPr lang="en-US"/>
           </a:p>
@@ -495,7 +495,7 @@
           <a:p>
             <a:fld id="{4521DC5A-3FE3-4FD1-BF87-57592AFF8A1E}" type="datetimeFigureOut">
               <a:rPr lang="en-US" smtClean="0"/>
-              <a:t>3/12/2014</a:t>
+              <a:t>3/16/2014</a:t>
             </a:fld>
             <a:endParaRPr lang="en-US"/>
           </a:p>
@@ -675,7 +675,7 @@
           <a:p>
             <a:fld id="{4521DC5A-3FE3-4FD1-BF87-57592AFF8A1E}" type="datetimeFigureOut">
               <a:rPr lang="en-US" smtClean="0"/>
-              <a:t>3/12/2014</a:t>
+              <a:t>3/16/2014</a:t>
             </a:fld>
             <a:endParaRPr lang="en-US"/>
           </a:p>
@@ -845,7 +845,7 @@
           <a:p>
             <a:fld id="{4521DC5A-3FE3-4FD1-BF87-57592AFF8A1E}" type="datetimeFigureOut">
               <a:rPr lang="en-US" smtClean="0"/>
-              <a:t>3/12/2014</a:t>
+              <a:t>3/16/2014</a:t>
             </a:fld>
             <a:endParaRPr lang="en-US"/>
           </a:p>
@@ -1091,7 +1091,7 @@
           <a:p>
             <a:fld id="{4521DC5A-3FE3-4FD1-BF87-57592AFF8A1E}" type="datetimeFigureOut">
               <a:rPr lang="en-US" smtClean="0"/>
-              <a:t>3/12/2014</a:t>
+              <a:t>3/16/2014</a:t>
             </a:fld>
             <a:endParaRPr lang="en-US"/>
           </a:p>
@@ -1379,7 +1379,7 @@
           <a:p>
             <a:fld id="{4521DC5A-3FE3-4FD1-BF87-57592AFF8A1E}" type="datetimeFigureOut">
               <a:rPr lang="en-US" smtClean="0"/>
-              <a:t>3/12/2014</a:t>
+              <a:t>3/16/2014</a:t>
             </a:fld>
             <a:endParaRPr lang="en-US"/>
           </a:p>
@@ -1801,7 +1801,7 @@
           <a:p>
             <a:fld id="{4521DC5A-3FE3-4FD1-BF87-57592AFF8A1E}" type="datetimeFigureOut">
               <a:rPr lang="en-US" smtClean="0"/>
-              <a:t>3/12/2014</a:t>
+              <a:t>3/16/2014</a:t>
             </a:fld>
             <a:endParaRPr lang="en-US"/>
           </a:p>
@@ -1919,7 +1919,7 @@
           <a:p>
             <a:fld id="{4521DC5A-3FE3-4FD1-BF87-57592AFF8A1E}" type="datetimeFigureOut">
               <a:rPr lang="en-US" smtClean="0"/>
-              <a:t>3/12/2014</a:t>
+              <a:t>3/16/2014</a:t>
             </a:fld>
             <a:endParaRPr lang="en-US"/>
           </a:p>
@@ -2014,7 +2014,7 @@
           <a:p>
             <a:fld id="{4521DC5A-3FE3-4FD1-BF87-57592AFF8A1E}" type="datetimeFigureOut">
               <a:rPr lang="en-US" smtClean="0"/>
-              <a:t>3/12/2014</a:t>
+              <a:t>3/16/2014</a:t>
             </a:fld>
             <a:endParaRPr lang="en-US"/>
           </a:p>
@@ -2291,7 +2291,7 @@
           <a:p>
             <a:fld id="{4521DC5A-3FE3-4FD1-BF87-57592AFF8A1E}" type="datetimeFigureOut">
               <a:rPr lang="en-US" smtClean="0"/>
-              <a:t>3/12/2014</a:t>
+              <a:t>3/16/2014</a:t>
             </a:fld>
             <a:endParaRPr lang="en-US"/>
           </a:p>
@@ -2544,7 +2544,7 @@
           <a:p>
             <a:fld id="{4521DC5A-3FE3-4FD1-BF87-57592AFF8A1E}" type="datetimeFigureOut">
               <a:rPr lang="en-US" smtClean="0"/>
-              <a:t>3/12/2014</a:t>
+              <a:t>3/16/2014</a:t>
             </a:fld>
             <a:endParaRPr lang="en-US"/>
           </a:p>
@@ -2757,7 +2757,7 @@
           <a:p>
             <a:fld id="{4521DC5A-3FE3-4FD1-BF87-57592AFF8A1E}" type="datetimeFigureOut">
               <a:rPr lang="en-US" smtClean="0"/>
-              <a:t>3/12/2014</a:t>
+              <a:t>3/16/2014</a:t>
             </a:fld>
             <a:endParaRPr lang="en-US"/>
           </a:p>
@@ -3165,16 +3165,399 @@
             <p:ph type="subTitle" idx="1"/>
           </p:nvPr>
         </p:nvSpPr>
-        <p:spPr/>
+        <p:spPr>
+          <a:xfrm>
+            <a:off x="1371600" y="3886200"/>
+            <a:ext cx="6400800" cy="609600"/>
+          </a:xfrm>
+        </p:spPr>
         <p:txBody>
           <a:bodyPr/>
           <a:lstStyle/>
           <a:p>
             <a:r>
               <a:rPr lang="en-US" dirty="0" smtClean="0"/>
+              <a:t>Sualeh </a:t>
+            </a:r>
+            <a:r>
+              <a:rPr lang="en-US" dirty="0" smtClean="0"/>
+              <a:t>Fatehi</a:t>
+            </a:r>
+            <a:endParaRPr lang="en-US" dirty="0"/>
+          </a:p>
+        </p:txBody>
+      </p:sp>
+      <p:sp>
+        <p:nvSpPr>
+          <p:cNvPr id="4" name="Rectangle 1"/>
+          <p:cNvSpPr>
+            <a:spLocks noChangeArrowheads="1"/>
+          </p:cNvSpPr>
+          <p:nvPr/>
+        </p:nvSpPr>
+        <p:spPr bwMode="auto">
+          <a:xfrm>
+            <a:off x="0" y="-69249"/>
+            <a:ext cx="9144000" cy="138499"/>
+          </a:xfrm>
+          <a:prstGeom prst="rect">
+            <a:avLst/>
+          </a:prstGeom>
+          <a:solidFill>
+            <a:srgbClr val="F5F5F5"/>
+          </a:solidFill>
+          <a:ln>
+            <a:noFill/>
+          </a:ln>
+          <a:effectLst/>
+          <a:extLst>
+            <a:ext uri="{91240B29-F687-4F45-9708-019B960494DF}">
+              <a14:hiddenLine xmlns:a14="http://schemas.microsoft.com/office/drawing/2010/main" w="9525">
+                <a:solidFill>
+                  <a:schemeClr val="tx1"/>
+                </a:solidFill>
+                <a:miter lim="800000"/>
+                <a:headEnd/>
+                <a:tailEnd/>
+              </a14:hiddenLine>
+            </a:ext>
+            <a:ext uri="{AF507438-7753-43E0-B8FC-AC1667EBCBE1}">
+              <a14:hiddenEffects xmlns:a14="http://schemas.microsoft.com/office/drawing/2010/main">
+                <a:effectLst>
+                  <a:outerShdw dist="35921" dir="2700000" algn="ctr" rotWithShape="0">
+                    <a:schemeClr val="bg2"/>
+                  </a:outerShdw>
+                </a:effectLst>
+              </a14:hiddenEffects>
+            </a:ext>
+          </a:extLst>
+        </p:spPr>
+        <p:txBody>
+          <a:bodyPr vert="horz" wrap="square" lIns="0" tIns="0" rIns="0" bIns="0" numCol="1" anchor="ctr" anchorCtr="0" compatLnSpc="1">
+            <a:prstTxWarp prst="textNoShape">
+              <a:avLst/>
+            </a:prstTxWarp>
+            <a:spAutoFit/>
+          </a:bodyPr>
+          <a:lstStyle>
+            <a:lvl1pPr fontAlgn="base">
+              <a:spcBef>
+                <a:spcPct val="0"/>
+              </a:spcBef>
+              <a:spcAft>
+                <a:spcPct val="0"/>
+              </a:spcAft>
+              <a:defRPr>
+                <a:solidFill>
+                  <a:schemeClr val="tx1"/>
+                </a:solidFill>
+                <a:latin typeface="Arial" pitchFamily="34" charset="0"/>
+                <a:cs typeface="Arial" pitchFamily="34" charset="0"/>
+              </a:defRPr>
+            </a:lvl1pPr>
+            <a:lvl2pPr fontAlgn="base">
+              <a:spcBef>
+                <a:spcPct val="0"/>
+              </a:spcBef>
+              <a:spcAft>
+                <a:spcPct val="0"/>
+              </a:spcAft>
+              <a:defRPr>
+                <a:solidFill>
+                  <a:schemeClr val="tx1"/>
+                </a:solidFill>
+                <a:latin typeface="Arial" pitchFamily="34" charset="0"/>
+                <a:cs typeface="Arial" pitchFamily="34" charset="0"/>
+              </a:defRPr>
+            </a:lvl2pPr>
+            <a:lvl3pPr fontAlgn="base">
+              <a:spcBef>
+                <a:spcPct val="0"/>
+              </a:spcBef>
+              <a:spcAft>
+                <a:spcPct val="0"/>
+              </a:spcAft>
+              <a:defRPr>
+                <a:solidFill>
+                  <a:schemeClr val="tx1"/>
+                </a:solidFill>
+                <a:latin typeface="Arial" pitchFamily="34" charset="0"/>
+                <a:cs typeface="Arial" pitchFamily="34" charset="0"/>
+              </a:defRPr>
+            </a:lvl3pPr>
+            <a:lvl4pPr fontAlgn="base">
+              <a:spcBef>
+                <a:spcPct val="0"/>
+              </a:spcBef>
+              <a:spcAft>
+                <a:spcPct val="0"/>
+              </a:spcAft>
+              <a:defRPr>
+                <a:solidFill>
+                  <a:schemeClr val="tx1"/>
+                </a:solidFill>
+                <a:latin typeface="Arial" pitchFamily="34" charset="0"/>
+                <a:cs typeface="Arial" pitchFamily="34" charset="0"/>
+              </a:defRPr>
+            </a:lvl4pPr>
+            <a:lvl5pPr fontAlgn="base">
+              <a:spcBef>
+                <a:spcPct val="0"/>
+              </a:spcBef>
+              <a:spcAft>
+                <a:spcPct val="0"/>
+              </a:spcAft>
+              <a:defRPr>
+                <a:solidFill>
+                  <a:schemeClr val="tx1"/>
+                </a:solidFill>
+                <a:latin typeface="Arial" pitchFamily="34" charset="0"/>
+                <a:cs typeface="Arial" pitchFamily="34" charset="0"/>
+              </a:defRPr>
+            </a:lvl5pPr>
+            <a:lvl6pPr fontAlgn="base">
+              <a:spcBef>
+                <a:spcPct val="0"/>
+              </a:spcBef>
+              <a:spcAft>
+                <a:spcPct val="0"/>
+              </a:spcAft>
+              <a:defRPr>
+                <a:solidFill>
+                  <a:schemeClr val="tx1"/>
+                </a:solidFill>
+                <a:latin typeface="Arial" pitchFamily="34" charset="0"/>
+                <a:cs typeface="Arial" pitchFamily="34" charset="0"/>
+              </a:defRPr>
+            </a:lvl6pPr>
+            <a:lvl7pPr fontAlgn="base">
+              <a:spcBef>
+                <a:spcPct val="0"/>
+              </a:spcBef>
+              <a:spcAft>
+                <a:spcPct val="0"/>
+              </a:spcAft>
+              <a:defRPr>
+                <a:solidFill>
+                  <a:schemeClr val="tx1"/>
+                </a:solidFill>
+                <a:latin typeface="Arial" pitchFamily="34" charset="0"/>
+                <a:cs typeface="Arial" pitchFamily="34" charset="0"/>
+              </a:defRPr>
+            </a:lvl7pPr>
+            <a:lvl8pPr fontAlgn="base">
+              <a:spcBef>
+                <a:spcPct val="0"/>
+              </a:spcBef>
+              <a:spcAft>
+                <a:spcPct val="0"/>
+              </a:spcAft>
+              <a:defRPr>
+                <a:solidFill>
+                  <a:schemeClr val="tx1"/>
+                </a:solidFill>
+                <a:latin typeface="Arial" pitchFamily="34" charset="0"/>
+                <a:cs typeface="Arial" pitchFamily="34" charset="0"/>
+              </a:defRPr>
+            </a:lvl8pPr>
+            <a:lvl9pPr fontAlgn="base">
+              <a:spcBef>
+                <a:spcPct val="0"/>
+              </a:spcBef>
+              <a:spcAft>
+                <a:spcPct val="0"/>
+              </a:spcAft>
+              <a:defRPr>
+                <a:solidFill>
+                  <a:schemeClr val="tx1"/>
+                </a:solidFill>
+                <a:latin typeface="Arial" pitchFamily="34" charset="0"/>
+                <a:cs typeface="Arial" pitchFamily="34" charset="0"/>
+              </a:defRPr>
+            </a:lvl9pPr>
+          </a:lstStyle>
+          <a:p>
+            <a:pPr marL="0" marR="0" lvl="0" indent="0" algn="ctr" defTabSz="914400" rtl="0" eaLnBrk="1" fontAlgn="base" latinLnBrk="0" hangingPunct="1">
+              <a:lnSpc>
+                <a:spcPct val="100000"/>
+              </a:lnSpc>
+              <a:spcBef>
+                <a:spcPct val="0"/>
+              </a:spcBef>
+              <a:spcAft>
+                <a:spcPct val="0"/>
+              </a:spcAft>
+              <a:buClrTx/>
+              <a:buSzTx/>
+              <a:buFontTx/>
+              <a:buNone/>
+              <a:tabLst/>
+            </a:pPr>
+            <a:endParaRPr kumimoji="0" lang="en-US" altLang="en-US" sz="900" b="0" i="0" u="none" strike="noStrike" cap="none" normalizeH="0" baseline="0" dirty="0" smtClean="0">
+              <a:ln>
+                <a:noFill/>
+              </a:ln>
+              <a:solidFill>
+                <a:srgbClr val="4374B7"/>
+              </a:solidFill>
+              <a:effectLst/>
+              <a:latin typeface="Helvetica Neue"/>
+              <a:cs typeface="Arial" pitchFamily="34" charset="0"/>
+            </a:endParaRPr>
+          </a:p>
+        </p:txBody>
+      </p:sp>
+      <p:pic>
+        <p:nvPicPr>
+          <p:cNvPr id="1026" name="Picture 2" descr="Creative Commons License">
+            <a:hlinkClick r:id="rId2"/>
+          </p:cNvPr>
+          <p:cNvPicPr>
+            <a:picLocks noChangeAspect="1" noChangeArrowheads="1"/>
+          </p:cNvPicPr>
+          <p:nvPr/>
+        </p:nvPicPr>
+        <p:blipFill>
+          <a:blip r:embed="rId3">
+            <a:extLst>
+              <a:ext uri="{28A0092B-C50C-407E-A947-70E740481C1C}">
+                <a14:useLocalDpi xmlns:a14="http://schemas.microsoft.com/office/drawing/2010/main" val="0"/>
+              </a:ext>
+            </a:extLst>
+          </a:blip>
+          <a:srcRect/>
+          <a:stretch>
+            <a:fillRect/>
+          </a:stretch>
+        </p:blipFill>
+        <p:spPr bwMode="auto">
+          <a:xfrm>
+            <a:off x="4062321" y="5515217"/>
+            <a:ext cx="769907" cy="271218"/>
+          </a:xfrm>
+          <a:prstGeom prst="rect">
+            <a:avLst/>
+          </a:prstGeom>
+          <a:noFill/>
+          <a:extLst>
+            <a:ext uri="{909E8E84-426E-40DD-AFC4-6F175D3DCCD1}">
+              <a14:hiddenFill xmlns:a14="http://schemas.microsoft.com/office/drawing/2010/main">
+                <a:solidFill>
+                  <a:srgbClr val="FFFFFF"/>
+                </a:solidFill>
+              </a14:hiddenFill>
+            </a:ext>
+          </a:extLst>
+        </p:spPr>
+      </p:pic>
+      <p:sp>
+        <p:nvSpPr>
+          <p:cNvPr id="5" name="Rectangle 4"/>
+          <p:cNvSpPr/>
+          <p:nvPr/>
+        </p:nvSpPr>
+        <p:spPr>
+          <a:xfrm>
+            <a:off x="1600200" y="5925979"/>
+            <a:ext cx="6477000" cy="246221"/>
+          </a:xfrm>
+          <a:prstGeom prst="rect">
+            <a:avLst/>
+          </a:prstGeom>
+        </p:spPr>
+        <p:txBody>
+          <a:bodyPr wrap="square">
+            <a:spAutoFit/>
+          </a:bodyPr>
+          <a:lstStyle/>
+          <a:p>
+            <a:pPr algn="ctr"/>
+            <a:r>
+              <a:rPr lang="en-US" altLang="en-US" sz="1000" dirty="0" smtClean="0">
+                <a:solidFill>
+                  <a:srgbClr val="000000"/>
+                </a:solidFill>
+                <a:cs typeface="Arial" pitchFamily="34" charset="0"/>
+              </a:rPr>
+              <a:t>This </a:t>
+            </a:r>
+            <a:r>
+              <a:rPr lang="en-US" altLang="en-US" sz="1000" dirty="0">
+                <a:solidFill>
+                  <a:srgbClr val="000000"/>
+                </a:solidFill>
+                <a:cs typeface="Arial" pitchFamily="34" charset="0"/>
+              </a:rPr>
+              <a:t>work by </a:t>
+            </a:r>
+            <a:r>
+              <a:rPr lang="en-US" altLang="en-US" sz="1000" dirty="0">
+                <a:solidFill>
+                  <a:srgbClr val="4374B7"/>
+                </a:solidFill>
+                <a:cs typeface="Arial" pitchFamily="34" charset="0"/>
+                <a:hlinkClick r:id="rId4"/>
+              </a:rPr>
               <a:t>Sualeh Fatehi</a:t>
             </a:r>
-            <a:endParaRPr lang="en-US" dirty="0"/>
+            <a:r>
+              <a:rPr lang="en-US" altLang="en-US" sz="1000" dirty="0">
+                <a:solidFill>
+                  <a:srgbClr val="000000"/>
+                </a:solidFill>
+                <a:cs typeface="Arial" pitchFamily="34" charset="0"/>
+              </a:rPr>
+              <a:t> is licensed under a </a:t>
+            </a:r>
+            <a:r>
+              <a:rPr lang="en-US" altLang="en-US" sz="1000" dirty="0">
+                <a:solidFill>
+                  <a:srgbClr val="4374B7"/>
+                </a:solidFill>
+                <a:cs typeface="Arial" pitchFamily="34" charset="0"/>
+                <a:hlinkClick r:id="rId2"/>
+              </a:rPr>
+              <a:t>Creative Commons Attribution-</a:t>
+            </a:r>
+            <a:r>
+              <a:rPr lang="en-US" altLang="en-US" sz="1000" dirty="0" err="1">
+                <a:solidFill>
+                  <a:srgbClr val="4374B7"/>
+                </a:solidFill>
+                <a:cs typeface="Arial" pitchFamily="34" charset="0"/>
+                <a:hlinkClick r:id="rId2"/>
+              </a:rPr>
+              <a:t>NonCommercial</a:t>
+            </a:r>
+            <a:r>
+              <a:rPr lang="en-US" altLang="en-US" sz="1000" dirty="0">
+                <a:solidFill>
+                  <a:srgbClr val="4374B7"/>
+                </a:solidFill>
+                <a:cs typeface="Arial" pitchFamily="34" charset="0"/>
+                <a:hlinkClick r:id="rId2"/>
+              </a:rPr>
+              <a:t> 4.0 International License</a:t>
+            </a:r>
+            <a:r>
+              <a:rPr lang="en-US" altLang="en-US" sz="1000" dirty="0">
+                <a:solidFill>
+                  <a:srgbClr val="000000"/>
+                </a:solidFill>
+                <a:cs typeface="Arial" pitchFamily="34" charset="0"/>
+              </a:rPr>
+              <a:t>.</a:t>
+            </a:r>
+            <a:r>
+              <a:rPr lang="en-US" altLang="en-US" sz="1000" dirty="0">
+                <a:solidFill>
+                  <a:prstClr val="black"/>
+                </a:solidFill>
+                <a:cs typeface="Arial" pitchFamily="34" charset="0"/>
+              </a:rPr>
+              <a:t> </a:t>
+            </a:r>
+            <a:endParaRPr lang="en-US" sz="1000" dirty="0"/>
           </a:p>
         </p:txBody>
       </p:sp>
@@ -3268,8 +3651,14 @@
                 <a:latin typeface="Consolas" panose="020B0609020204030204" pitchFamily="49" charset="0"/>
                 <a:cs typeface="Consolas" panose="020B0609020204030204" pitchFamily="49" charset="0"/>
               </a:rPr>
-              <a:t>Several </a:t>
-            </a:r>
+              <a:t>Several problems here:</a:t>
+            </a:r>
+          </a:p>
+          <a:p>
+            <a:pPr marL="514350" indent="-514350">
+              <a:buFont typeface="+mj-lt"/>
+              <a:buAutoNum type="arabicPeriod"/>
+            </a:pPr>
             <a:r>
               <a:rPr lang="en-US" sz="2800" dirty="0" smtClean="0">
                 <a:solidFill>
@@ -3280,49 +3669,7 @@
                 <a:latin typeface="Consolas" panose="020B0609020204030204" pitchFamily="49" charset="0"/>
                 <a:cs typeface="Consolas" panose="020B0609020204030204" pitchFamily="49" charset="0"/>
               </a:rPr>
-              <a:t>problems here:</a:t>
-            </a:r>
-          </a:p>
-          <a:p>
-            <a:pPr marL="514350" indent="-514350">
-              <a:buFont typeface="+mj-lt"/>
-              <a:buAutoNum type="arabicPeriod"/>
-            </a:pPr>
-            <a:r>
-              <a:rPr lang="en-US" sz="2800" dirty="0" smtClean="0">
-                <a:solidFill>
-                  <a:schemeClr val="accent3">
-                    <a:lumMod val="75000"/>
-                  </a:schemeClr>
-                </a:solidFill>
-                <a:latin typeface="Consolas" panose="020B0609020204030204" pitchFamily="49" charset="0"/>
-                <a:cs typeface="Consolas" panose="020B0609020204030204" pitchFamily="49" charset="0"/>
-              </a:rPr>
-              <a:t>Which </a:t>
-            </a:r>
-            <a:r>
-              <a:rPr lang="en-US" sz="2800" dirty="0" smtClean="0">
-                <a:solidFill>
-                  <a:schemeClr val="accent3">
-                    <a:lumMod val="75000"/>
-                  </a:schemeClr>
-                </a:solidFill>
-                <a:latin typeface="Consolas" panose="020B0609020204030204" pitchFamily="49" charset="0"/>
-                <a:cs typeface="Consolas" panose="020B0609020204030204" pitchFamily="49" charset="0"/>
-              </a:rPr>
-              <a:t>12 </a:t>
-            </a:r>
-            <a:r>
-              <a:rPr lang="en-US" sz="2800" dirty="0" smtClean="0">
-                <a:solidFill>
-                  <a:schemeClr val="accent3">
-                    <a:lumMod val="75000"/>
-                  </a:schemeClr>
-                </a:solidFill>
-                <a:latin typeface="Consolas" panose="020B0609020204030204" pitchFamily="49" charset="0"/>
-                <a:cs typeface="Consolas" panose="020B0609020204030204" pitchFamily="49" charset="0"/>
-              </a:rPr>
-              <a:t>is for which date field?</a:t>
+              <a:t>Which 12 is for which date field?</a:t>
             </a:r>
           </a:p>
           <a:p>
@@ -3417,15 +3764,6 @@
               </a:rPr>
               <a:t>They got the year right! Not quite…</a:t>
             </a:r>
-            <a:endParaRPr lang="en-US" sz="2800" dirty="0" smtClean="0">
-              <a:solidFill>
-                <a:schemeClr val="accent3">
-                  <a:lumMod val="75000"/>
-                </a:schemeClr>
-              </a:solidFill>
-              <a:latin typeface="Consolas" panose="020B0609020204030204" pitchFamily="49" charset="0"/>
-              <a:cs typeface="Consolas" panose="020B0609020204030204" pitchFamily="49" charset="0"/>
-            </a:endParaRPr>
           </a:p>
           <a:p>
             <a:pPr marL="0" indent="0">
@@ -3574,19 +3912,7 @@
                 <a:latin typeface="Consolas" panose="020B0609020204030204" pitchFamily="49" charset="0"/>
                 <a:cs typeface="Consolas" panose="020B0609020204030204" pitchFamily="49" charset="0"/>
               </a:rPr>
-              <a:t>More </a:t>
-            </a:r>
-            <a:r>
-              <a:rPr lang="en-US" sz="2800" dirty="0" smtClean="0">
-                <a:solidFill>
-                  <a:schemeClr val="accent3">
-                    <a:lumMod val="75000"/>
-                  </a:schemeClr>
-                </a:solidFill>
-                <a:latin typeface="Consolas" panose="020B0609020204030204" pitchFamily="49" charset="0"/>
-                <a:cs typeface="Consolas" panose="020B0609020204030204" pitchFamily="49" charset="0"/>
-              </a:rPr>
-              <a:t>than that, there is a </a:t>
+              <a:t>More than that, there is a </a:t>
             </a:r>
             <a:r>
               <a:rPr lang="en-US" sz="2800" dirty="0" err="1" smtClean="0">
@@ -4683,19 +5009,7 @@
                 <a:latin typeface="Consolas" panose="020B0609020204030204" pitchFamily="49" charset="0"/>
                 <a:cs typeface="Consolas" panose="020B0609020204030204" pitchFamily="49" charset="0"/>
               </a:rPr>
-              <a:t>// </a:t>
-            </a:r>
-            <a:r>
-              <a:rPr lang="en-US" sz="2600" dirty="0">
-                <a:solidFill>
-                  <a:schemeClr val="accent3">
-                    <a:lumMod val="50000"/>
-                  </a:schemeClr>
-                </a:solidFill>
-                <a:latin typeface="Consolas" panose="020B0609020204030204" pitchFamily="49" charset="0"/>
-                <a:cs typeface="Consolas" panose="020B0609020204030204" pitchFamily="49" charset="0"/>
-              </a:rPr>
-              <a:t>November 10, 0010 12:00:00 AM EST</a:t>
+              <a:t>// November 10, 0010 12:00:00 AM EST</a:t>
             </a:r>
           </a:p>
         </p:txBody>
@@ -4894,11 +5208,7 @@
           <a:p>
             <a:r>
               <a:rPr lang="en-US" dirty="0" smtClean="0"/>
-              <a:t>No Problems </a:t>
-            </a:r>
-            <a:r>
-              <a:rPr lang="en-US" dirty="0" smtClean="0"/>
-              <a:t>Getting a Date</a:t>
+              <a:t>No Problems Getting a Date</a:t>
             </a:r>
             <a:endParaRPr lang="en-US" dirty="0"/>
           </a:p>
@@ -4934,7 +5244,25 @@
                 <a:latin typeface="Consolas" panose="020B0609020204030204" pitchFamily="49" charset="0"/>
                 <a:cs typeface="Consolas" panose="020B0609020204030204" pitchFamily="49" charset="0"/>
               </a:rPr>
-              <a:t>No problems </a:t>
+              <a:t>No problems here:</a:t>
+            </a:r>
+          </a:p>
+          <a:p>
+            <a:pPr marL="514350" indent="-514350">
+              <a:buFont typeface="+mj-lt"/>
+              <a:buAutoNum type="arabicPeriod"/>
+            </a:pPr>
+            <a:r>
+              <a:rPr lang="en-US" sz="2800" dirty="0">
+                <a:solidFill>
+                  <a:schemeClr val="accent3">
+                    <a:lumMod val="75000"/>
+                  </a:schemeClr>
+                </a:solidFill>
+                <a:latin typeface="Consolas" panose="020B0609020204030204" pitchFamily="49" charset="0"/>
+                <a:cs typeface="Consolas" panose="020B0609020204030204" pitchFamily="49" charset="0"/>
+              </a:rPr>
+              <a:t>ISO 8601 order </a:t>
             </a:r>
             <a:r>
               <a:rPr lang="en-US" sz="2800" dirty="0" smtClean="0">
@@ -4946,14 +5274,8 @@
                 <a:latin typeface="Consolas" panose="020B0609020204030204" pitchFamily="49" charset="0"/>
                 <a:cs typeface="Consolas" panose="020B0609020204030204" pitchFamily="49" charset="0"/>
               </a:rPr>
-              <a:t>here:</a:t>
-            </a:r>
-          </a:p>
-          <a:p>
-            <a:pPr marL="514350" indent="-514350">
-              <a:buFont typeface="+mj-lt"/>
-              <a:buAutoNum type="arabicPeriod"/>
-            </a:pPr>
+              <a:t>of fields - </a:t>
+            </a:r>
             <a:r>
               <a:rPr lang="en-US" sz="2800" dirty="0">
                 <a:solidFill>
@@ -4964,7 +5286,7 @@
                 <a:latin typeface="Consolas" panose="020B0609020204030204" pitchFamily="49" charset="0"/>
                 <a:cs typeface="Consolas" panose="020B0609020204030204" pitchFamily="49" charset="0"/>
               </a:rPr>
-              <a:t>ISO 8601 order </a:t>
+              <a:t>year, month, </a:t>
             </a:r>
             <a:r>
               <a:rPr lang="en-US" sz="2800" dirty="0" smtClean="0">
@@ -4976,20 +5298,14 @@
                 <a:latin typeface="Consolas" panose="020B0609020204030204" pitchFamily="49" charset="0"/>
                 <a:cs typeface="Consolas" panose="020B0609020204030204" pitchFamily="49" charset="0"/>
               </a:rPr>
-              <a:t>of fields - </a:t>
-            </a:r>
-            <a:r>
-              <a:rPr lang="en-US" sz="2800" dirty="0">
-                <a:solidFill>
-                  <a:schemeClr val="accent3">
-                    <a:lumMod val="75000"/>
-                  </a:schemeClr>
-                </a:solidFill>
-                <a:latin typeface="Consolas" panose="020B0609020204030204" pitchFamily="49" charset="0"/>
-                <a:cs typeface="Consolas" panose="020B0609020204030204" pitchFamily="49" charset="0"/>
-              </a:rPr>
-              <a:t>year, month, </a:t>
-            </a:r>
+              <a:t>day.</a:t>
+            </a:r>
+          </a:p>
+          <a:p>
+            <a:pPr marL="514350" indent="-514350">
+              <a:buFont typeface="+mj-lt"/>
+              <a:buAutoNum type="arabicPeriod"/>
+            </a:pPr>
             <a:r>
               <a:rPr lang="en-US" sz="2800" dirty="0" smtClean="0">
                 <a:solidFill>
@@ -5000,17 +5316,8 @@
                 <a:latin typeface="Consolas" panose="020B0609020204030204" pitchFamily="49" charset="0"/>
                 <a:cs typeface="Consolas" panose="020B0609020204030204" pitchFamily="49" charset="0"/>
               </a:rPr>
-              <a:t>day.</a:t>
-            </a:r>
-            <a:endParaRPr lang="en-US" sz="2800" dirty="0" smtClean="0">
-              <a:solidFill>
-                <a:schemeClr val="accent3">
-                  <a:lumMod val="75000"/>
-                </a:schemeClr>
-              </a:solidFill>
-              <a:latin typeface="Consolas" panose="020B0609020204030204" pitchFamily="49" charset="0"/>
-              <a:cs typeface="Consolas" panose="020B0609020204030204" pitchFamily="49" charset="0"/>
-            </a:endParaRPr>
+              <a:t>Month 12 is December.</a:t>
+            </a:r>
           </a:p>
           <a:p>
             <a:pPr marL="514350" indent="-514350">
@@ -5027,35 +5334,8 @@
                 <a:latin typeface="Consolas" panose="020B0609020204030204" pitchFamily="49" charset="0"/>
                 <a:cs typeface="Consolas" panose="020B0609020204030204" pitchFamily="49" charset="0"/>
               </a:rPr>
-              <a:t>Month 12 is December.</a:t>
-            </a:r>
-          </a:p>
-          <a:p>
-            <a:pPr marL="514350" indent="-514350">
-              <a:buFont typeface="+mj-lt"/>
-              <a:buAutoNum type="arabicPeriod"/>
-            </a:pPr>
-            <a:r>
-              <a:rPr lang="en-US" sz="2800" dirty="0" smtClean="0">
-                <a:solidFill>
-                  <a:schemeClr val="accent3">
-                    <a:lumMod val="75000"/>
-                  </a:schemeClr>
-                </a:solidFill>
-                <a:latin typeface="Consolas" panose="020B0609020204030204" pitchFamily="49" charset="0"/>
-                <a:cs typeface="Consolas" panose="020B0609020204030204" pitchFamily="49" charset="0"/>
-              </a:rPr>
               <a:t>Year is 12 AD.</a:t>
             </a:r>
-            <a:endParaRPr lang="en-US" sz="2800" dirty="0" smtClean="0">
-              <a:solidFill>
-                <a:schemeClr val="accent3">
-                  <a:lumMod val="75000"/>
-                </a:schemeClr>
-              </a:solidFill>
-              <a:latin typeface="Consolas" panose="020B0609020204030204" pitchFamily="49" charset="0"/>
-              <a:cs typeface="Consolas" panose="020B0609020204030204" pitchFamily="49" charset="0"/>
-            </a:endParaRPr>
           </a:p>
           <a:p>
             <a:pPr marL="0" indent="0">
@@ -5120,25 +5400,8 @@
                 <a:latin typeface="Consolas" panose="020B0609020204030204" pitchFamily="49" charset="0"/>
                 <a:cs typeface="Consolas" panose="020B0609020204030204" pitchFamily="49" charset="0"/>
               </a:rPr>
-              <a:t>// </a:t>
-            </a:r>
-            <a:r>
-              <a:rPr lang="en-US" sz="2800" dirty="0" smtClean="0">
-                <a:solidFill>
-                  <a:schemeClr val="tx2"/>
-                </a:solidFill>
-                <a:latin typeface="Consolas" panose="020B0609020204030204" pitchFamily="49" charset="0"/>
-                <a:cs typeface="Consolas" panose="020B0609020204030204" pitchFamily="49" charset="0"/>
-              </a:rPr>
-              <a:t>0012-12-12</a:t>
-            </a:r>
-            <a:endParaRPr lang="en-US" sz="2800" dirty="0" smtClean="0">
-              <a:solidFill>
-                <a:schemeClr val="tx2"/>
-              </a:solidFill>
-              <a:latin typeface="Consolas" panose="020B0609020204030204" pitchFamily="49" charset="0"/>
-              <a:cs typeface="Consolas" panose="020B0609020204030204" pitchFamily="49" charset="0"/>
-            </a:endParaRPr>
+              <a:t>// 0012-12-12</a:t>
+            </a:r>
           </a:p>
           <a:p>
             <a:pPr marL="514350" indent="-514350">
@@ -6322,6 +6585,36 @@
           </a:p>
         </p:txBody>
       </p:sp>
+      <p:sp>
+        <p:nvSpPr>
+          <p:cNvPr id="4" name="TextBox 3"/>
+          <p:cNvSpPr txBox="1"/>
+          <p:nvPr/>
+        </p:nvSpPr>
+        <p:spPr>
+          <a:xfrm>
+            <a:off x="533400" y="5715000"/>
+            <a:ext cx="8001000" cy="553998"/>
+          </a:xfrm>
+          <a:prstGeom prst="rect">
+            <a:avLst/>
+          </a:prstGeom>
+          <a:noFill/>
+        </p:spPr>
+        <p:txBody>
+          <a:bodyPr wrap="square" rtlCol="0">
+            <a:spAutoFit/>
+          </a:bodyPr>
+          <a:lstStyle/>
+          <a:p>
+            <a:r>
+              <a:rPr lang="en-US" sz="3000" dirty="0" smtClean="0"/>
+              <a:t>* See temporal queries later </a:t>
+            </a:r>
+            <a:endParaRPr lang="en-US" sz="3000" dirty="0"/>
+          </a:p>
+        </p:txBody>
+      </p:sp>
     </p:spTree>
     <p:extLst>
       <p:ext uri="{BB962C8B-B14F-4D97-AF65-F5344CB8AC3E}">
@@ -8377,6 +8670,109 @@
                                       </p:cBhvr>
                                       <p:to x="100000" y="100000"/>
                                     </p:animScale>
+                                  </p:childTnLst>
+                                </p:cTn>
+                              </p:par>
+                            </p:childTnLst>
+                          </p:cTn>
+                        </p:par>
+                      </p:childTnLst>
+                    </p:cTn>
+                  </p:par>
+                  <p:par>
+                    <p:cTn id="101" fill="hold">
+                      <p:stCondLst>
+                        <p:cond delay="indefinite"/>
+                      </p:stCondLst>
+                      <p:childTnLst>
+                        <p:par>
+                          <p:cTn id="102" fill="hold">
+                            <p:stCondLst>
+                              <p:cond delay="0"/>
+                            </p:stCondLst>
+                            <p:childTnLst>
+                              <p:par>
+                                <p:cTn id="103" presetID="2" presetClass="entr" presetSubtype="4" fill="hold" nodeType="clickEffect">
+                                  <p:stCondLst>
+                                    <p:cond delay="0"/>
+                                  </p:stCondLst>
+                                  <p:childTnLst>
+                                    <p:set>
+                                      <p:cBhvr>
+                                        <p:cTn id="104" dur="1" fill="hold">
+                                          <p:stCondLst>
+                                            <p:cond delay="0"/>
+                                          </p:stCondLst>
+                                        </p:cTn>
+                                        <p:tgtEl>
+                                          <p:spTgt spid="4">
+                                            <p:txEl>
+                                              <p:pRg st="0" end="0"/>
+                                            </p:txEl>
+                                          </p:spTgt>
+                                        </p:tgtEl>
+                                        <p:attrNameLst>
+                                          <p:attrName>style.visibility</p:attrName>
+                                        </p:attrNameLst>
+                                      </p:cBhvr>
+                                      <p:to>
+                                        <p:strVal val="visible"/>
+                                      </p:to>
+                                    </p:set>
+                                    <p:anim calcmode="lin" valueType="num">
+                                      <p:cBhvr additive="base">
+                                        <p:cTn id="105" dur="500" fill="hold"/>
+                                        <p:tgtEl>
+                                          <p:spTgt spid="4">
+                                            <p:txEl>
+                                              <p:pRg st="0" end="0"/>
+                                            </p:txEl>
+                                          </p:spTgt>
+                                        </p:tgtEl>
+                                        <p:attrNameLst>
+                                          <p:attrName>ppt_x</p:attrName>
+                                        </p:attrNameLst>
+                                      </p:cBhvr>
+                                      <p:tavLst>
+                                        <p:tav tm="0">
+                                          <p:val>
+                                            <p:strVal val="#ppt_x"/>
+                                          </p:val>
+                                        </p:tav>
+                                        <p:tav tm="100000">
+                                          <p:val>
+                                            <p:strVal val="#ppt_x"/>
+                                          </p:val>
+                                        </p:tav>
+                                      </p:tavLst>
+                                    </p:anim>
+                                    <p:anim calcmode="lin" valueType="num">
+                                      <p:cBhvr additive="base">
+                                        <p:cTn id="106" dur="500" fill="hold"/>
+                                        <p:tgtEl>
+                                          <p:spTgt spid="4">
+                                            <p:txEl>
+                                              <p:pRg st="0" end="0"/>
+                                            </p:txEl>
+                                          </p:spTgt>
+                                        </p:tgtEl>
+                                        <p:attrNameLst>
+                                          <p:attrName>ppt_y</p:attrName>
+                                        </p:attrNameLst>
+                                      </p:cBhvr>
+                                      <p:tavLst>
+                                        <p:tav tm="0">
+                                          <p:val>
+                                            <p:strVal val="1+#ppt_h/2"/>
+                                          </p:val>
+                                        </p:tav>
+                                        <p:tav tm="100000">
+                                          <p:val>
+                                            <p:strVal val="#ppt_y"/>
+                                          </p:val>
+                                        </p:tav>
+                                      </p:tavLst>
+                                    </p:anim>
                                   </p:childTnLst>
                                 </p:cTn>
                               </p:par>
@@ -9001,7 +9397,6 @@
               <a:rPr lang="en-US" dirty="0"/>
               <a:t>not change with a change of seasons</a:t>
             </a:r>
-            <a:endParaRPr lang="en-US" dirty="0"/>
           </a:p>
           <a:p>
             <a:r>
@@ -9126,8 +9521,14 @@
                 <a:latin typeface="Consolas" panose="020B0609020204030204" pitchFamily="49" charset="0"/>
                 <a:cs typeface="Consolas" panose="020B0609020204030204" pitchFamily="49" charset="0"/>
               </a:rPr>
-              <a:t>Several </a:t>
-            </a:r>
+              <a:t>Several problems here:</a:t>
+            </a:r>
+          </a:p>
+          <a:p>
+            <a:pPr marL="514350" indent="-514350">
+              <a:buFont typeface="+mj-lt"/>
+              <a:buAutoNum type="arabicPeriod"/>
+            </a:pPr>
             <a:r>
               <a:rPr lang="en-US" sz="2800" dirty="0" smtClean="0">
                 <a:solidFill>
@@ -9138,49 +9539,7 @@
                 <a:latin typeface="Consolas" panose="020B0609020204030204" pitchFamily="49" charset="0"/>
                 <a:cs typeface="Consolas" panose="020B0609020204030204" pitchFamily="49" charset="0"/>
               </a:rPr>
-              <a:t>problems here:</a:t>
-            </a:r>
-          </a:p>
-          <a:p>
-            <a:pPr marL="514350" indent="-514350">
-              <a:buFont typeface="+mj-lt"/>
-              <a:buAutoNum type="arabicPeriod"/>
-            </a:pPr>
-            <a:r>
-              <a:rPr lang="en-US" sz="2800" dirty="0" smtClean="0">
-                <a:solidFill>
-                  <a:schemeClr val="accent3">
-                    <a:lumMod val="75000"/>
-                  </a:schemeClr>
-                </a:solidFill>
-                <a:latin typeface="Consolas" panose="020B0609020204030204" pitchFamily="49" charset="0"/>
-                <a:cs typeface="Consolas" panose="020B0609020204030204" pitchFamily="49" charset="0"/>
-              </a:rPr>
-              <a:t>Which </a:t>
-            </a:r>
-            <a:r>
-              <a:rPr lang="en-US" sz="2800" dirty="0" smtClean="0">
-                <a:solidFill>
-                  <a:schemeClr val="accent3">
-                    <a:lumMod val="75000"/>
-                  </a:schemeClr>
-                </a:solidFill>
-                <a:latin typeface="Consolas" panose="020B0609020204030204" pitchFamily="49" charset="0"/>
-                <a:cs typeface="Consolas" panose="020B0609020204030204" pitchFamily="49" charset="0"/>
-              </a:rPr>
-              <a:t>12 </a:t>
-            </a:r>
-            <a:r>
-              <a:rPr lang="en-US" sz="2800" dirty="0" smtClean="0">
-                <a:solidFill>
-                  <a:schemeClr val="accent3">
-                    <a:lumMod val="75000"/>
-                  </a:schemeClr>
-                </a:solidFill>
-                <a:latin typeface="Consolas" panose="020B0609020204030204" pitchFamily="49" charset="0"/>
-                <a:cs typeface="Consolas" panose="020B0609020204030204" pitchFamily="49" charset="0"/>
-              </a:rPr>
-              <a:t>is for which date field?</a:t>
+              <a:t>Which 12 is for which date field?</a:t>
             </a:r>
           </a:p>
           <a:p>
@@ -9273,65 +9632,8 @@
                 <a:latin typeface="Consolas" panose="020B0609020204030204" pitchFamily="49" charset="0"/>
                 <a:cs typeface="Consolas" panose="020B0609020204030204" pitchFamily="49" charset="0"/>
               </a:rPr>
-              <a:t>Really</a:t>
-            </a:r>
-            <a:r>
-              <a:rPr lang="en-US" sz="2800" dirty="0" smtClean="0">
-                <a:solidFill>
-                  <a:schemeClr val="accent3">
-                    <a:lumMod val="75000"/>
-                  </a:schemeClr>
-                </a:solidFill>
-                <a:latin typeface="Consolas" panose="020B0609020204030204" pitchFamily="49" charset="0"/>
-                <a:cs typeface="Consolas" panose="020B0609020204030204" pitchFamily="49" charset="0"/>
-              </a:rPr>
-              <a:t>, a year called </a:t>
-            </a:r>
-            <a:r>
-              <a:rPr lang="en-US" sz="2800" dirty="0" smtClean="0">
-                <a:solidFill>
-                  <a:schemeClr val="accent3">
-                    <a:lumMod val="75000"/>
-                  </a:schemeClr>
-                </a:solidFill>
-                <a:latin typeface="Consolas" panose="020B0609020204030204" pitchFamily="49" charset="0"/>
-                <a:cs typeface="Consolas" panose="020B0609020204030204" pitchFamily="49" charset="0"/>
-              </a:rPr>
-              <a:t>12? 12 AD? No </a:t>
-            </a:r>
-            <a:r>
-              <a:rPr lang="en-US" sz="2800" dirty="0" smtClean="0">
-                <a:solidFill>
-                  <a:schemeClr val="accent3">
-                    <a:lumMod val="75000"/>
-                  </a:schemeClr>
-                </a:solidFill>
-                <a:latin typeface="Consolas" panose="020B0609020204030204" pitchFamily="49" charset="0"/>
-                <a:cs typeface="Consolas" panose="020B0609020204030204" pitchFamily="49" charset="0"/>
-              </a:rPr>
-              <a:t>- </a:t>
-            </a:r>
-            <a:r>
-              <a:rPr lang="en-US" sz="2800" dirty="0" smtClean="0">
-                <a:solidFill>
-                  <a:schemeClr val="accent3">
-                    <a:lumMod val="75000"/>
-                  </a:schemeClr>
-                </a:solidFill>
-                <a:latin typeface="Consolas" panose="020B0609020204030204" pitchFamily="49" charset="0"/>
-                <a:cs typeface="Consolas" panose="020B0609020204030204" pitchFamily="49" charset="0"/>
-              </a:rPr>
-              <a:t>1913.</a:t>
-            </a:r>
-            <a:endParaRPr lang="en-US" sz="2800" dirty="0" smtClean="0">
-              <a:solidFill>
-                <a:schemeClr val="accent3">
-                  <a:lumMod val="75000"/>
-                </a:schemeClr>
-              </a:solidFill>
-              <a:latin typeface="Consolas" panose="020B0609020204030204" pitchFamily="49" charset="0"/>
-              <a:cs typeface="Consolas" panose="020B0609020204030204" pitchFamily="49" charset="0"/>
-            </a:endParaRPr>
+              <a:t>Really, a year called 12? 12 AD? No - 1913.</a:t>
+            </a:r>
           </a:p>
           <a:p>
             <a:pPr marL="0" indent="0">
@@ -9370,10 +9672,6 @@
               </a:rPr>
               <a:t>);</a:t>
             </a:r>
-            <a:endParaRPr lang="en-US" sz="3500" dirty="0" smtClean="0">
-              <a:latin typeface="Consolas" panose="020B0609020204030204" pitchFamily="49" charset="0"/>
-              <a:cs typeface="Consolas" panose="020B0609020204030204" pitchFamily="49" charset="0"/>
-            </a:endParaRPr>
           </a:p>
           <a:p>
             <a:pPr marL="0" indent="0">
@@ -9440,19 +9738,7 @@
                 <a:latin typeface="Consolas" panose="020B0609020204030204" pitchFamily="49" charset="0"/>
                 <a:cs typeface="Consolas" panose="020B0609020204030204" pitchFamily="49" charset="0"/>
               </a:rPr>
-              <a:t>More </a:t>
-            </a:r>
-            <a:r>
-              <a:rPr lang="en-US" sz="2800" dirty="0" smtClean="0">
-                <a:solidFill>
-                  <a:schemeClr val="accent3">
-                    <a:lumMod val="75000"/>
-                  </a:schemeClr>
-                </a:solidFill>
-                <a:latin typeface="Consolas" panose="020B0609020204030204" pitchFamily="49" charset="0"/>
-                <a:cs typeface="Consolas" panose="020B0609020204030204" pitchFamily="49" charset="0"/>
-              </a:rPr>
-              <a:t>than that, there is a </a:t>
+              <a:t>More than that, there is a </a:t>
             </a:r>
             <a:r>
               <a:rPr lang="en-US" sz="2800" dirty="0" err="1" smtClean="0">
@@ -11137,7 +11423,6 @@
               <a:rPr lang="en-US" sz="3000" dirty="0"/>
               <a:t>have a negative value, if it is created with an end point that occurs before the start point</a:t>
             </a:r>
-            <a:endParaRPr lang="en-US" sz="3000" dirty="0"/>
           </a:p>
         </p:txBody>
       </p:sp>
@@ -11346,10 +11631,270 @@
         </p:nvSpPr>
         <p:spPr/>
         <p:txBody>
-          <a:bodyPr/>
+          <a:bodyPr>
+            <a:normAutofit fontScale="40000" lnSpcReduction="20000"/>
+          </a:bodyPr>
           <a:lstStyle/>
           <a:p>
-            <a:endParaRPr lang="en-US"/>
+            <a:r>
+              <a:rPr lang="en-US" sz="7500" dirty="0"/>
+              <a:t>Gets the current instant using a time-zone </a:t>
+            </a:r>
+          </a:p>
+          <a:p>
+            <a:r>
+              <a:rPr lang="en-US" sz="7500" dirty="0" smtClean="0"/>
+              <a:t>Use instead </a:t>
+            </a:r>
+            <a:r>
+              <a:rPr lang="en-US" sz="7500" dirty="0"/>
+              <a:t>of </a:t>
+            </a:r>
+            <a:r>
+              <a:rPr lang="en-US" sz="7500" dirty="0" err="1">
+                <a:latin typeface="Consolas" panose="020B0609020204030204" pitchFamily="49" charset="0"/>
+                <a:cs typeface="Consolas" panose="020B0609020204030204" pitchFamily="49" charset="0"/>
+              </a:rPr>
+              <a:t>System.currentTimeMillis</a:t>
+            </a:r>
+            <a:r>
+              <a:rPr lang="en-US" sz="7500" dirty="0" smtClean="0">
+                <a:latin typeface="Consolas" panose="020B0609020204030204" pitchFamily="49" charset="0"/>
+                <a:cs typeface="Consolas" panose="020B0609020204030204" pitchFamily="49" charset="0"/>
+              </a:rPr>
+              <a:t>() </a:t>
+            </a:r>
+          </a:p>
+          <a:p>
+            <a:r>
+              <a:rPr lang="en-US" sz="7500" dirty="0" smtClean="0"/>
+              <a:t>Use alternate clock for testing</a:t>
+            </a:r>
+          </a:p>
+          <a:p>
+            <a:pPr marL="0" indent="0">
+              <a:buNone/>
+            </a:pPr>
+            <a:r>
+              <a:rPr lang="en-US" sz="5000" dirty="0" smtClean="0">
+                <a:latin typeface="Consolas" panose="020B0609020204030204" pitchFamily="49" charset="0"/>
+                <a:cs typeface="Consolas" panose="020B0609020204030204" pitchFamily="49" charset="0"/>
+              </a:rPr>
+              <a:t/>
+            </a:r>
+            <a:br>
+              <a:rPr lang="en-US" sz="5000" dirty="0" smtClean="0">
+                <a:latin typeface="Consolas" panose="020B0609020204030204" pitchFamily="49" charset="0"/>
+                <a:cs typeface="Consolas" panose="020B0609020204030204" pitchFamily="49" charset="0"/>
+              </a:rPr>
+            </a:br>
+            <a:r>
+              <a:rPr lang="en-US" sz="5000" dirty="0" smtClean="0">
+                <a:latin typeface="Consolas" panose="020B0609020204030204" pitchFamily="49" charset="0"/>
+                <a:cs typeface="Consolas" panose="020B0609020204030204" pitchFamily="49" charset="0"/>
+              </a:rPr>
+              <a:t>public </a:t>
+            </a:r>
+            <a:r>
+              <a:rPr lang="en-US" sz="5000" dirty="0">
+                <a:latin typeface="Consolas" panose="020B0609020204030204" pitchFamily="49" charset="0"/>
+                <a:cs typeface="Consolas" panose="020B0609020204030204" pitchFamily="49" charset="0"/>
+              </a:rPr>
+              <a:t>class </a:t>
+            </a:r>
+            <a:r>
+              <a:rPr lang="en-US" sz="5000" dirty="0" err="1">
+                <a:latin typeface="Consolas" panose="020B0609020204030204" pitchFamily="49" charset="0"/>
+                <a:cs typeface="Consolas" panose="020B0609020204030204" pitchFamily="49" charset="0"/>
+              </a:rPr>
+              <a:t>MyBean</a:t>
+            </a:r>
+            <a:r>
+              <a:rPr lang="en-US" sz="5000" dirty="0">
+                <a:latin typeface="Consolas" panose="020B0609020204030204" pitchFamily="49" charset="0"/>
+                <a:cs typeface="Consolas" panose="020B0609020204030204" pitchFamily="49" charset="0"/>
+              </a:rPr>
+              <a:t> {</a:t>
+            </a:r>
+          </a:p>
+          <a:p>
+            <a:pPr marL="0" indent="0">
+              <a:buNone/>
+            </a:pPr>
+            <a:r>
+              <a:rPr lang="en-US" sz="5000" dirty="0">
+                <a:latin typeface="Consolas" panose="020B0609020204030204" pitchFamily="49" charset="0"/>
+                <a:cs typeface="Consolas" panose="020B0609020204030204" pitchFamily="49" charset="0"/>
+              </a:rPr>
+              <a:t>  </a:t>
+            </a:r>
+            <a:r>
+              <a:rPr lang="en-US" sz="5000" dirty="0" smtClean="0">
+                <a:latin typeface="Consolas" panose="020B0609020204030204" pitchFamily="49" charset="0"/>
+                <a:cs typeface="Consolas" panose="020B0609020204030204" pitchFamily="49" charset="0"/>
+              </a:rPr>
+              <a:t>@Inject private </a:t>
+            </a:r>
+            <a:r>
+              <a:rPr lang="en-US" sz="5000" dirty="0">
+                <a:latin typeface="Consolas" panose="020B0609020204030204" pitchFamily="49" charset="0"/>
+                <a:cs typeface="Consolas" panose="020B0609020204030204" pitchFamily="49" charset="0"/>
+              </a:rPr>
+              <a:t>Clock </a:t>
+            </a:r>
+            <a:r>
+              <a:rPr lang="en-US" sz="5000" dirty="0" err="1">
+                <a:latin typeface="Consolas" panose="020B0609020204030204" pitchFamily="49" charset="0"/>
+                <a:cs typeface="Consolas" panose="020B0609020204030204" pitchFamily="49" charset="0"/>
+              </a:rPr>
+              <a:t>clock</a:t>
+            </a:r>
+            <a:r>
+              <a:rPr lang="en-US" sz="5000" dirty="0" smtClean="0">
+                <a:latin typeface="Consolas" panose="020B0609020204030204" pitchFamily="49" charset="0"/>
+                <a:cs typeface="Consolas" panose="020B0609020204030204" pitchFamily="49" charset="0"/>
+              </a:rPr>
+              <a:t>;</a:t>
+            </a:r>
+          </a:p>
+          <a:p>
+            <a:pPr marL="0" indent="0">
+              <a:buNone/>
+            </a:pPr>
+            <a:r>
+              <a:rPr lang="en-US" sz="5000" dirty="0" smtClean="0">
+                <a:latin typeface="Consolas" panose="020B0609020204030204" pitchFamily="49" charset="0"/>
+                <a:cs typeface="Consolas" panose="020B0609020204030204" pitchFamily="49" charset="0"/>
+              </a:rPr>
+              <a:t>  public void process(</a:t>
+            </a:r>
+            <a:r>
+              <a:rPr lang="en-US" sz="5000" dirty="0" err="1" smtClean="0">
+                <a:latin typeface="Consolas" panose="020B0609020204030204" pitchFamily="49" charset="0"/>
+                <a:cs typeface="Consolas" panose="020B0609020204030204" pitchFamily="49" charset="0"/>
+              </a:rPr>
+              <a:t>LocalDate</a:t>
+            </a:r>
+            <a:r>
+              <a:rPr lang="en-US" sz="5000" dirty="0" smtClean="0">
+                <a:latin typeface="Consolas" panose="020B0609020204030204" pitchFamily="49" charset="0"/>
+                <a:cs typeface="Consolas" panose="020B0609020204030204" pitchFamily="49" charset="0"/>
+              </a:rPr>
+              <a:t> </a:t>
+            </a:r>
+            <a:r>
+              <a:rPr lang="en-US" sz="5000" dirty="0" err="1" smtClean="0">
+                <a:latin typeface="Consolas" panose="020B0609020204030204" pitchFamily="49" charset="0"/>
+                <a:cs typeface="Consolas" panose="020B0609020204030204" pitchFamily="49" charset="0"/>
+              </a:rPr>
+              <a:t>eventDate</a:t>
+            </a:r>
+            <a:r>
+              <a:rPr lang="en-US" sz="5000" dirty="0" smtClean="0">
+                <a:latin typeface="Consolas" panose="020B0609020204030204" pitchFamily="49" charset="0"/>
+                <a:cs typeface="Consolas" panose="020B0609020204030204" pitchFamily="49" charset="0"/>
+              </a:rPr>
+              <a:t>) {</a:t>
+            </a:r>
+          </a:p>
+          <a:p>
+            <a:pPr marL="0" indent="0">
+              <a:buNone/>
+            </a:pPr>
+            <a:r>
+              <a:rPr lang="en-US" sz="5000" dirty="0" smtClean="0">
+                <a:latin typeface="Consolas" panose="020B0609020204030204" pitchFamily="49" charset="0"/>
+                <a:cs typeface="Consolas" panose="020B0609020204030204" pitchFamily="49" charset="0"/>
+              </a:rPr>
+              <a:t>    </a:t>
+            </a:r>
+            <a:r>
+              <a:rPr lang="en-US" sz="5000" dirty="0">
+                <a:latin typeface="Consolas" panose="020B0609020204030204" pitchFamily="49" charset="0"/>
+                <a:cs typeface="Consolas" panose="020B0609020204030204" pitchFamily="49" charset="0"/>
+              </a:rPr>
+              <a:t>if (</a:t>
+            </a:r>
+            <a:r>
+              <a:rPr lang="en-US" sz="5000" dirty="0" err="1">
+                <a:latin typeface="Consolas" panose="020B0609020204030204" pitchFamily="49" charset="0"/>
+                <a:cs typeface="Consolas" panose="020B0609020204030204" pitchFamily="49" charset="0"/>
+              </a:rPr>
+              <a:t>eventDate.isBefore</a:t>
+            </a:r>
+            <a:r>
+              <a:rPr lang="en-US" sz="5000" dirty="0">
+                <a:latin typeface="Consolas" panose="020B0609020204030204" pitchFamily="49" charset="0"/>
+                <a:cs typeface="Consolas" panose="020B0609020204030204" pitchFamily="49" charset="0"/>
+              </a:rPr>
+              <a:t>(</a:t>
+            </a:r>
+            <a:r>
+              <a:rPr lang="en-US" sz="5000" dirty="0" err="1">
+                <a:latin typeface="Consolas" panose="020B0609020204030204" pitchFamily="49" charset="0"/>
+                <a:cs typeface="Consolas" panose="020B0609020204030204" pitchFamily="49" charset="0"/>
+              </a:rPr>
+              <a:t>LocalDate.now</a:t>
+            </a:r>
+            <a:r>
+              <a:rPr lang="en-US" sz="5000" dirty="0">
+                <a:latin typeface="Consolas" panose="020B0609020204030204" pitchFamily="49" charset="0"/>
+                <a:cs typeface="Consolas" panose="020B0609020204030204" pitchFamily="49" charset="0"/>
+              </a:rPr>
+              <a:t>(clock)) {</a:t>
+            </a:r>
+          </a:p>
+          <a:p>
+            <a:pPr marL="0" indent="0">
+              <a:buNone/>
+            </a:pPr>
+            <a:r>
+              <a:rPr lang="en-US" sz="5000" dirty="0">
+                <a:latin typeface="Consolas" panose="020B0609020204030204" pitchFamily="49" charset="0"/>
+                <a:cs typeface="Consolas" panose="020B0609020204030204" pitchFamily="49" charset="0"/>
+              </a:rPr>
+              <a:t>      ...</a:t>
+            </a:r>
+          </a:p>
+          <a:p>
+            <a:pPr marL="0" indent="0">
+              <a:buNone/>
+            </a:pPr>
+            <a:r>
+              <a:rPr lang="en-US" sz="5000" dirty="0">
+                <a:latin typeface="Consolas" panose="020B0609020204030204" pitchFamily="49" charset="0"/>
+                <a:cs typeface="Consolas" panose="020B0609020204030204" pitchFamily="49" charset="0"/>
+              </a:rPr>
+              <a:t>    }</a:t>
+            </a:r>
+          </a:p>
+          <a:p>
+            <a:pPr marL="0" indent="0">
+              <a:buNone/>
+            </a:pPr>
+            <a:r>
+              <a:rPr lang="en-US" sz="5000" dirty="0">
+                <a:latin typeface="Consolas" panose="020B0609020204030204" pitchFamily="49" charset="0"/>
+                <a:cs typeface="Consolas" panose="020B0609020204030204" pitchFamily="49" charset="0"/>
+              </a:rPr>
+              <a:t>  }</a:t>
+            </a:r>
+          </a:p>
+          <a:p>
+            <a:pPr marL="0" indent="0">
+              <a:buNone/>
+            </a:pPr>
+            <a:r>
+              <a:rPr lang="en-US" sz="5000" dirty="0">
+                <a:latin typeface="Consolas" panose="020B0609020204030204" pitchFamily="49" charset="0"/>
+                <a:cs typeface="Consolas" panose="020B0609020204030204" pitchFamily="49" charset="0"/>
+              </a:rPr>
+              <a:t>}</a:t>
+            </a:r>
+            <a:endParaRPr lang="en-US" sz="5000" dirty="0">
+              <a:latin typeface="Consolas" panose="020B0609020204030204" pitchFamily="49" charset="0"/>
+              <a:cs typeface="Consolas" panose="020B0609020204030204" pitchFamily="49" charset="0"/>
+            </a:endParaRPr>
           </a:p>
         </p:txBody>
       </p:sp>
@@ -12535,11 +13080,7 @@
             </a:r>
             <a:r>
               <a:rPr lang="en-US" sz="2400" dirty="0"/>
-              <a:t> - </a:t>
-            </a:r>
-            <a:r>
-              <a:rPr lang="en-US" sz="2400" dirty="0"/>
-              <a:t>r</a:t>
+              <a:t> - r</a:t>
             </a:r>
             <a:r>
               <a:rPr lang="en-US" sz="2400" dirty="0" smtClean="0"/>

</xml_diff>